<commit_message>
final code and artifacts
</commit_message>
<xml_diff>
--- a/artifacts/arch/hackathon PPT.pptx
+++ b/artifacts/arch/hackathon PPT.pptx
@@ -104,6 +104,11 @@
       </a:defRPr>
     </a:lvl9pPr>
   </p:defaultTextStyle>
+  <p:extLst>
+    <p:ext uri="{EFAFB233-063F-42B5-8137-9DF3F51BA10A}">
+      <p15:sldGuideLst xmlns:p15="http://schemas.microsoft.com/office/powerpoint/2012/main"/>
+    </p:ext>
+  </p:extLst>
 </p:presentation>
 </file>
 
@@ -2966,6 +2971,46 @@
       </p:grpSpPr>
       <p:sp>
         <p:nvSpPr>
+          <p:cNvPr id="3" name="Rectangle 2"/>
+          <p:cNvSpPr/>
+          <p:nvPr/>
+        </p:nvSpPr>
+        <p:spPr>
+          <a:xfrm>
+            <a:off x="2304267" y="1212415"/>
+            <a:ext cx="752845" cy="327012"/>
+          </a:xfrm>
+          <a:prstGeom prst="rect">
+            <a:avLst/>
+          </a:prstGeom>
+        </p:spPr>
+        <p:style>
+          <a:lnRef idx="2">
+            <a:schemeClr val="accent1">
+              <a:shade val="50000"/>
+            </a:schemeClr>
+          </a:lnRef>
+          <a:fillRef idx="1">
+            <a:schemeClr val="accent1"/>
+          </a:fillRef>
+          <a:effectRef idx="0">
+            <a:schemeClr val="accent1"/>
+          </a:effectRef>
+          <a:fontRef idx="minor">
+            <a:schemeClr val="lt1"/>
+          </a:fontRef>
+        </p:style>
+        <p:txBody>
+          <a:bodyPr rtlCol="0" anchor="ctr"/>
+          <a:lstStyle/>
+          <a:p>
+            <a:pPr algn="ctr"/>
+            <a:endParaRPr lang="en-US"/>
+          </a:p>
+        </p:txBody>
+      </p:sp>
+      <p:sp>
+        <p:nvSpPr>
           <p:cNvPr id="4" name="Rounded Rectangle 3"/>
           <p:cNvSpPr/>
           <p:nvPr/>
@@ -3453,8 +3498,8 @@
         </p:nvCxnSpPr>
         <p:spPr>
           <a:xfrm flipV="1">
-            <a:off x="2250042" y="2702560"/>
-            <a:ext cx="346036" cy="457200"/>
+            <a:off x="2173101" y="2702560"/>
+            <a:ext cx="422977" cy="534990"/>
           </a:xfrm>
           <a:prstGeom prst="straightConnector1">
             <a:avLst/>
@@ -3662,7 +3707,7 @@
         </p:blipFill>
         <p:spPr>
           <a:xfrm>
-            <a:off x="540300" y="531773"/>
+            <a:off x="740281" y="636538"/>
             <a:ext cx="1648055" cy="562053"/>
           </a:xfrm>
           <a:prstGeom prst="rect">
@@ -3728,39 +3773,6 @@
           <a:xfrm flipV="1">
             <a:off x="9293497" y="3167622"/>
             <a:ext cx="801112" cy="22618"/>
-          </a:xfrm>
-          <a:prstGeom prst="straightConnector1">
-            <a:avLst/>
-          </a:prstGeom>
-          <a:ln>
-            <a:tailEnd type="triangle"/>
-          </a:ln>
-        </p:spPr>
-        <p:style>
-          <a:lnRef idx="3">
-            <a:schemeClr val="dk1"/>
-          </a:lnRef>
-          <a:fillRef idx="0">
-            <a:schemeClr val="dk1"/>
-          </a:fillRef>
-          <a:effectRef idx="2">
-            <a:schemeClr val="dk1"/>
-          </a:effectRef>
-          <a:fontRef idx="minor">
-            <a:schemeClr val="tx1"/>
-          </a:fontRef>
-        </p:style>
-      </p:cxnSp>
-      <p:cxnSp>
-        <p:nvCxnSpPr>
-          <p:cNvPr id="53" name="Straight Arrow Connector 52"/>
-          <p:cNvCxnSpPr/>
-          <p:nvPr/>
-        </p:nvCxnSpPr>
-        <p:spPr>
-          <a:xfrm flipH="1">
-            <a:off x="9293498" y="3520440"/>
-            <a:ext cx="801111" cy="14342"/>
           </a:xfrm>
           <a:prstGeom prst="straightConnector1">
             <a:avLst/>
@@ -4066,7 +4078,7 @@
         </p:nvSpPr>
         <p:spPr>
           <a:xfrm>
-            <a:off x="1995730" y="1741031"/>
+            <a:off x="2073396" y="1803599"/>
             <a:ext cx="3280944" cy="307777"/>
           </a:xfrm>
           <a:prstGeom prst="rect">
@@ -4081,10 +4093,18 @@
           <a:lstStyle/>
           <a:p>
             <a:r>
-              <a:rPr lang="en-US" sz="1400" dirty="0" smtClean="0"/>
+              <a:rPr lang="en-US" sz="1400" dirty="0" smtClean="0">
+                <a:solidFill>
+                  <a:srgbClr val="7030A0"/>
+                </a:solidFill>
+              </a:rPr>
               <a:t>Similar Incident finder</a:t>
             </a:r>
-            <a:endParaRPr lang="en-US" sz="1400" dirty="0"/>
+            <a:endParaRPr lang="en-US" sz="1400" dirty="0">
+              <a:solidFill>
+                <a:srgbClr val="7030A0"/>
+              </a:solidFill>
+            </a:endParaRPr>
           </a:p>
         </p:txBody>
       </p:sp>
@@ -4402,7 +4422,7 @@
         </p:nvSpPr>
         <p:spPr>
           <a:xfrm>
-            <a:off x="4123887" y="1310072"/>
+            <a:off x="4263168" y="1343813"/>
             <a:ext cx="1217534" cy="307777"/>
           </a:xfrm>
           <a:prstGeom prst="rect">
@@ -4530,7 +4550,7 @@
         </p:blipFill>
         <p:spPr>
           <a:xfrm>
-            <a:off x="5606962" y="4841240"/>
+            <a:off x="5665663" y="4393807"/>
             <a:ext cx="571580" cy="704948"/>
           </a:xfrm>
           <a:prstGeom prst="rect">
@@ -4541,13 +4561,15 @@
       <p:cxnSp>
         <p:nvCxnSpPr>
           <p:cNvPr id="111" name="Straight Arrow Connector 110"/>
-          <p:cNvCxnSpPr/>
+          <p:cNvCxnSpPr>
+            <a:endCxn id="109" idx="1"/>
+          </p:cNvCxnSpPr>
           <p:nvPr/>
         </p:nvCxnSpPr>
         <p:spPr>
           <a:xfrm>
-            <a:off x="3334086" y="4629626"/>
-            <a:ext cx="2326272" cy="664079"/>
+            <a:off x="3313030" y="4715535"/>
+            <a:ext cx="2352633" cy="30746"/>
           </a:xfrm>
           <a:prstGeom prst="straightConnector1">
             <a:avLst/>
@@ -4582,7 +4604,7 @@
         </p:nvSpPr>
         <p:spPr>
           <a:xfrm>
-            <a:off x="5660358" y="5546188"/>
+            <a:off x="5635873" y="4990628"/>
             <a:ext cx="868893" cy="307777"/>
           </a:xfrm>
           <a:prstGeom prst="rect">
@@ -4636,7 +4658,7 @@
         </p:nvSpPr>
         <p:spPr>
           <a:xfrm>
-            <a:off x="2194211" y="1057802"/>
+            <a:off x="2250042" y="273920"/>
             <a:ext cx="1203809" cy="307777"/>
           </a:xfrm>
           <a:prstGeom prst="rect">
@@ -4666,7 +4688,7 @@
         </p:nvCxnSpPr>
         <p:spPr>
           <a:xfrm>
-            <a:off x="3104532" y="792862"/>
+            <a:off x="3096152" y="888739"/>
             <a:ext cx="2689974" cy="487182"/>
           </a:xfrm>
           <a:prstGeom prst="bentConnector3">
@@ -4716,41 +4738,6 @@
           </a:prstGeom>
         </p:spPr>
       </p:pic>
-      <p:cxnSp>
-        <p:nvCxnSpPr>
-          <p:cNvPr id="122" name="Straight Arrow Connector 121"/>
-          <p:cNvCxnSpPr>
-            <a:stCxn id="12" idx="2"/>
-          </p:cNvCxnSpPr>
-          <p:nvPr/>
-        </p:nvCxnSpPr>
-        <p:spPr>
-          <a:xfrm>
-            <a:off x="1939854" y="3799840"/>
-            <a:ext cx="750838" cy="1493865"/>
-          </a:xfrm>
-          <a:prstGeom prst="straightConnector1">
-            <a:avLst/>
-          </a:prstGeom>
-          <a:ln>
-            <a:tailEnd type="triangle"/>
-          </a:ln>
-        </p:spPr>
-        <p:style>
-          <a:lnRef idx="3">
-            <a:schemeClr val="accent4"/>
-          </a:lnRef>
-          <a:fillRef idx="0">
-            <a:schemeClr val="accent4"/>
-          </a:fillRef>
-          <a:effectRef idx="2">
-            <a:schemeClr val="accent4"/>
-          </a:effectRef>
-          <a:fontRef idx="minor">
-            <a:schemeClr val="tx1"/>
-          </a:fontRef>
-        </p:style>
-      </p:cxnSp>
       <p:sp>
         <p:nvSpPr>
           <p:cNvPr id="124" name="TextBox 123"/>
@@ -4759,8 +4746,8 @@
         </p:nvSpPr>
         <p:spPr>
           <a:xfrm>
-            <a:off x="2440502" y="5891702"/>
-            <a:ext cx="1461738" cy="307777"/>
+            <a:off x="2350246" y="5936233"/>
+            <a:ext cx="1753407" cy="307777"/>
           </a:xfrm>
           <a:prstGeom prst="rect">
             <a:avLst/>
@@ -4774,10 +4761,18 @@
           <a:lstStyle/>
           <a:p>
             <a:r>
-              <a:rPr lang="en-US" sz="1400" dirty="0" smtClean="0"/>
-              <a:t>Health check</a:t>
-            </a:r>
-            <a:endParaRPr lang="en-US" sz="1400" dirty="0"/>
+              <a:rPr lang="en-US" sz="1400" dirty="0" smtClean="0">
+                <a:solidFill>
+                  <a:srgbClr val="FF0000"/>
+                </a:solidFill>
+              </a:rPr>
+              <a:t>Health Check module</a:t>
+            </a:r>
+            <a:endParaRPr lang="en-US" sz="1400" dirty="0">
+              <a:solidFill>
+                <a:srgbClr val="FF0000"/>
+              </a:solidFill>
+            </a:endParaRPr>
           </a:p>
         </p:txBody>
       </p:sp>
@@ -4897,7 +4892,7 @@
         </p:blipFill>
         <p:spPr>
           <a:xfrm>
-            <a:off x="4521285" y="5744125"/>
+            <a:off x="4755963" y="5709920"/>
             <a:ext cx="855696" cy="767728"/>
           </a:xfrm>
           <a:prstGeom prst="rect">
@@ -4913,8 +4908,8 @@
         </p:nvSpPr>
         <p:spPr>
           <a:xfrm>
-            <a:off x="4343207" y="5402767"/>
-            <a:ext cx="1073692" cy="307777"/>
+            <a:off x="5497036" y="5601661"/>
+            <a:ext cx="1257294" cy="738664"/>
           </a:xfrm>
           <a:prstGeom prst="rect">
             <a:avLst/>
@@ -4922,54 +4917,282 @@
           <a:noFill/>
         </p:spPr>
         <p:txBody>
-          <a:bodyPr wrap="none" rtlCol="0">
+          <a:bodyPr wrap="square" rtlCol="0">
             <a:spAutoFit/>
           </a:bodyPr>
           <a:lstStyle/>
           <a:p>
             <a:r>
               <a:rPr lang="en-US" sz="1400" dirty="0" smtClean="0"/>
-              <a:t>Prometheus</a:t>
+              <a:t>Prometheus monitoring applications</a:t>
             </a:r>
             <a:endParaRPr lang="en-US" sz="1400" dirty="0"/>
           </a:p>
         </p:txBody>
       </p:sp>
+      <p:sp>
+        <p:nvSpPr>
+          <p:cNvPr id="2" name="TextBox 1"/>
+          <p:cNvSpPr txBox="1"/>
+          <p:nvPr/>
+        </p:nvSpPr>
+        <p:spPr>
+          <a:xfrm>
+            <a:off x="2317425" y="1207022"/>
+            <a:ext cx="794942" cy="307777"/>
+          </a:xfrm>
+          <a:prstGeom prst="rect">
+            <a:avLst/>
+          </a:prstGeom>
+          <a:noFill/>
+        </p:spPr>
+        <p:txBody>
+          <a:bodyPr wrap="square" rtlCol="0">
+            <a:spAutoFit/>
+          </a:bodyPr>
+          <a:lstStyle/>
+          <a:p>
+            <a:r>
+              <a:rPr lang="en-US" sz="1400" dirty="0" smtClean="0"/>
+              <a:t>Incident</a:t>
+            </a:r>
+            <a:endParaRPr lang="en-US" sz="1400" dirty="0"/>
+          </a:p>
+        </p:txBody>
+      </p:sp>
+      <p:sp>
+        <p:nvSpPr>
+          <p:cNvPr id="13" name="TextBox 12"/>
+          <p:cNvSpPr txBox="1"/>
+          <p:nvPr/>
+        </p:nvSpPr>
+        <p:spPr>
+          <a:xfrm>
+            <a:off x="5230995" y="-7822"/>
+            <a:ext cx="2344976" cy="369332"/>
+          </a:xfrm>
+          <a:prstGeom prst="rect">
+            <a:avLst/>
+          </a:prstGeom>
+          <a:noFill/>
+        </p:spPr>
+        <p:txBody>
+          <a:bodyPr wrap="square" rtlCol="0">
+            <a:spAutoFit/>
+          </a:bodyPr>
+          <a:lstStyle/>
+          <a:p>
+            <a:r>
+              <a:rPr lang="en-US" b="1" dirty="0" smtClean="0"/>
+              <a:t>CHATBOT</a:t>
+            </a:r>
+            <a:endParaRPr lang="en-US" b="1" dirty="0"/>
+          </a:p>
+        </p:txBody>
+      </p:sp>
+      <p:pic>
+        <p:nvPicPr>
+          <p:cNvPr id="25" name="Picture 24"/>
+          <p:cNvPicPr>
+            <a:picLocks noChangeAspect="1"/>
+          </p:cNvPicPr>
+          <p:nvPr/>
+        </p:nvPicPr>
+        <p:blipFill>
+          <a:blip r:embed="rId11"/>
+          <a:stretch>
+            <a:fillRect/>
+          </a:stretch>
+        </p:blipFill>
+        <p:spPr>
+          <a:xfrm>
+            <a:off x="6444118" y="5695727"/>
+            <a:ext cx="830671" cy="788788"/>
+          </a:xfrm>
+          <a:prstGeom prst="rect">
+            <a:avLst/>
+          </a:prstGeom>
+        </p:spPr>
+      </p:pic>
       <p:cxnSp>
         <p:nvCxnSpPr>
-          <p:cNvPr id="135" name="Straight Arrow Connector 134"/>
-          <p:cNvCxnSpPr>
-            <a:stCxn id="120" idx="3"/>
-          </p:cNvCxnSpPr>
+          <p:cNvPr id="29" name="Straight Arrow Connector 28"/>
+          <p:cNvCxnSpPr/>
           <p:nvPr/>
         </p:nvCxnSpPr>
         <p:spPr>
-          <a:xfrm>
-            <a:off x="3317047" y="5623905"/>
-            <a:ext cx="1204238" cy="330200"/>
+          <a:xfrm flipV="1">
+            <a:off x="5615026" y="6311744"/>
+            <a:ext cx="832459" cy="3663"/>
           </a:xfrm>
           <a:prstGeom prst="straightConnector1">
             <a:avLst/>
           </a:prstGeom>
           <a:ln>
+            <a:solidFill>
+              <a:srgbClr val="FF0000"/>
+            </a:solidFill>
+            <a:headEnd type="triangle"/>
             <a:tailEnd type="triangle"/>
           </a:ln>
         </p:spPr>
         <p:style>
           <a:lnRef idx="3">
-            <a:schemeClr val="accent4"/>
+            <a:schemeClr val="dk1"/>
           </a:lnRef>
           <a:fillRef idx="0">
-            <a:schemeClr val="accent4"/>
+            <a:schemeClr val="dk1"/>
           </a:fillRef>
           <a:effectRef idx="2">
-            <a:schemeClr val="accent4"/>
+            <a:schemeClr val="dk1"/>
           </a:effectRef>
           <a:fontRef idx="minor">
             <a:schemeClr val="tx1"/>
           </a:fontRef>
         </p:style>
       </p:cxnSp>
+      <p:cxnSp>
+        <p:nvCxnSpPr>
+          <p:cNvPr id="34" name="Straight Arrow Connector 33"/>
+          <p:cNvCxnSpPr>
+            <a:endCxn id="132" idx="1"/>
+          </p:cNvCxnSpPr>
+          <p:nvPr/>
+        </p:nvCxnSpPr>
+        <p:spPr>
+          <a:xfrm>
+            <a:off x="3313030" y="5738732"/>
+            <a:ext cx="1442933" cy="355052"/>
+          </a:xfrm>
+          <a:prstGeom prst="straightConnector1">
+            <a:avLst/>
+          </a:prstGeom>
+          <a:ln>
+            <a:solidFill>
+              <a:srgbClr val="FF0000"/>
+            </a:solidFill>
+            <a:tailEnd type="triangle"/>
+          </a:ln>
+        </p:spPr>
+        <p:style>
+          <a:lnRef idx="3">
+            <a:schemeClr val="accent2"/>
+          </a:lnRef>
+          <a:fillRef idx="0">
+            <a:schemeClr val="accent2"/>
+          </a:fillRef>
+          <a:effectRef idx="2">
+            <a:schemeClr val="accent2"/>
+          </a:effectRef>
+          <a:fontRef idx="minor">
+            <a:schemeClr val="tx1"/>
+          </a:fontRef>
+        </p:style>
+      </p:cxnSp>
+      <p:cxnSp>
+        <p:nvCxnSpPr>
+          <p:cNvPr id="37" name="Straight Arrow Connector 36"/>
+          <p:cNvCxnSpPr/>
+          <p:nvPr/>
+        </p:nvCxnSpPr>
+        <p:spPr>
+          <a:xfrm flipH="1" flipV="1">
+            <a:off x="1983520" y="3780802"/>
+            <a:ext cx="739494" cy="1544345"/>
+          </a:xfrm>
+          <a:prstGeom prst="straightConnector1">
+            <a:avLst/>
+          </a:prstGeom>
+          <a:ln>
+            <a:solidFill>
+              <a:srgbClr val="FF0000"/>
+            </a:solidFill>
+            <a:tailEnd type="triangle"/>
+          </a:ln>
+        </p:spPr>
+        <p:style>
+          <a:lnRef idx="3">
+            <a:schemeClr val="accent2"/>
+          </a:lnRef>
+          <a:fillRef idx="0">
+            <a:schemeClr val="accent2"/>
+          </a:fillRef>
+          <a:effectRef idx="2">
+            <a:schemeClr val="accent2"/>
+          </a:effectRef>
+          <a:fontRef idx="minor">
+            <a:schemeClr val="tx1"/>
+          </a:fontRef>
+        </p:style>
+      </p:cxnSp>
+      <p:sp>
+        <p:nvSpPr>
+          <p:cNvPr id="40" name="TextBox 39"/>
+          <p:cNvSpPr txBox="1"/>
+          <p:nvPr/>
+        </p:nvSpPr>
+        <p:spPr>
+          <a:xfrm>
+            <a:off x="3746775" y="5597776"/>
+            <a:ext cx="821201" cy="307777"/>
+          </a:xfrm>
+          <a:prstGeom prst="rect">
+            <a:avLst/>
+          </a:prstGeom>
+          <a:noFill/>
+        </p:spPr>
+        <p:txBody>
+          <a:bodyPr wrap="square" rtlCol="0">
+            <a:spAutoFit/>
+          </a:bodyPr>
+          <a:lstStyle/>
+          <a:p>
+            <a:r>
+              <a:rPr lang="en-US" sz="1400" dirty="0" smtClean="0"/>
+              <a:t>Polling</a:t>
+            </a:r>
+            <a:endParaRPr lang="en-US" sz="1400" dirty="0"/>
+          </a:p>
+        </p:txBody>
+      </p:sp>
+      <p:sp>
+        <p:nvSpPr>
+          <p:cNvPr id="41" name="TextBox 40"/>
+          <p:cNvSpPr txBox="1"/>
+          <p:nvPr/>
+        </p:nvSpPr>
+        <p:spPr>
+          <a:xfrm>
+            <a:off x="1995115" y="5017370"/>
+            <a:ext cx="666941" cy="307777"/>
+          </a:xfrm>
+          <a:prstGeom prst="rect">
+            <a:avLst/>
+          </a:prstGeom>
+          <a:noFill/>
+        </p:spPr>
+        <p:txBody>
+          <a:bodyPr wrap="square" rtlCol="0">
+            <a:spAutoFit/>
+          </a:bodyPr>
+          <a:lstStyle/>
+          <a:p>
+            <a:r>
+              <a:rPr lang="en-US" sz="1400" b="1" dirty="0" smtClean="0">
+                <a:solidFill>
+                  <a:srgbClr val="FF0000"/>
+                </a:solidFill>
+              </a:rPr>
+              <a:t>ALERT</a:t>
+            </a:r>
+            <a:endParaRPr lang="en-US" sz="1400" b="1" dirty="0">
+              <a:solidFill>
+                <a:srgbClr val="FF0000"/>
+              </a:solidFill>
+            </a:endParaRPr>
+          </a:p>
+        </p:txBody>
+      </p:sp>
     </p:spTree>
     <p:extLst>
       <p:ext uri="{BB962C8B-B14F-4D97-AF65-F5344CB8AC3E}">

</xml_diff>